<commit_message>
added a product cycle
</commit_message>
<xml_diff>
--- a/foil.pptx
+++ b/foil.pptx
@@ -107,6 +107,11 @@
       </a:defRPr>
     </a:lvl9pPr>
   </p:defaultTextStyle>
+  <p:extLst>
+    <p:ext uri="{EFAFB233-063F-42B5-8137-9DF3F51BA10A}">
+      <p15:sldGuideLst xmlns:p15="http://schemas.microsoft.com/office/powerpoint/2012/main"/>
+    </p:ext>
+  </p:extLst>
 </p:presentation>
 </file>
 
@@ -192,7 +197,7 @@
           <a:p>
             <a:fld id="{3D2B0B15-84F1-4A3B-9611-398DC30E0BF6}" type="datetimeFigureOut">
               <a:rPr lang="en-US" smtClean="0"/>
-              <a:t>10/9/2018</a:t>
+              <a:t>10/11/2018</a:t>
             </a:fld>
             <a:endParaRPr lang="en-US"/>
           </a:p>
@@ -606,7 +611,7 @@
           <a:p>
             <a:fld id="{64C42225-5FDD-4BC4-A595-FF986F799F51}" type="datetimeFigureOut">
               <a:rPr lang="en-US" smtClean="0"/>
-              <a:t>10/9/2018</a:t>
+              <a:t>10/11/2018</a:t>
             </a:fld>
             <a:endParaRPr lang="en-US"/>
           </a:p>
@@ -804,7 +809,7 @@
           <a:p>
             <a:fld id="{64C42225-5FDD-4BC4-A595-FF986F799F51}" type="datetimeFigureOut">
               <a:rPr lang="en-US" smtClean="0"/>
-              <a:t>10/9/2018</a:t>
+              <a:t>10/11/2018</a:t>
             </a:fld>
             <a:endParaRPr lang="en-US"/>
           </a:p>
@@ -1012,7 +1017,7 @@
           <a:p>
             <a:fld id="{64C42225-5FDD-4BC4-A595-FF986F799F51}" type="datetimeFigureOut">
               <a:rPr lang="en-US" smtClean="0"/>
-              <a:t>10/9/2018</a:t>
+              <a:t>10/11/2018</a:t>
             </a:fld>
             <a:endParaRPr lang="en-US"/>
           </a:p>
@@ -1210,7 +1215,7 @@
           <a:p>
             <a:fld id="{64C42225-5FDD-4BC4-A595-FF986F799F51}" type="datetimeFigureOut">
               <a:rPr lang="en-US" smtClean="0"/>
-              <a:t>10/9/2018</a:t>
+              <a:t>10/11/2018</a:t>
             </a:fld>
             <a:endParaRPr lang="en-US"/>
           </a:p>
@@ -1485,7 +1490,7 @@
           <a:p>
             <a:fld id="{64C42225-5FDD-4BC4-A595-FF986F799F51}" type="datetimeFigureOut">
               <a:rPr lang="en-US" smtClean="0"/>
-              <a:t>10/9/2018</a:t>
+              <a:t>10/11/2018</a:t>
             </a:fld>
             <a:endParaRPr lang="en-US"/>
           </a:p>
@@ -1750,7 +1755,7 @@
           <a:p>
             <a:fld id="{64C42225-5FDD-4BC4-A595-FF986F799F51}" type="datetimeFigureOut">
               <a:rPr lang="en-US" smtClean="0"/>
-              <a:t>10/9/2018</a:t>
+              <a:t>10/11/2018</a:t>
             </a:fld>
             <a:endParaRPr lang="en-US"/>
           </a:p>
@@ -2162,7 +2167,7 @@
           <a:p>
             <a:fld id="{64C42225-5FDD-4BC4-A595-FF986F799F51}" type="datetimeFigureOut">
               <a:rPr lang="en-US" smtClean="0"/>
-              <a:t>10/9/2018</a:t>
+              <a:t>10/11/2018</a:t>
             </a:fld>
             <a:endParaRPr lang="en-US"/>
           </a:p>
@@ -2303,7 +2308,7 @@
           <a:p>
             <a:fld id="{64C42225-5FDD-4BC4-A595-FF986F799F51}" type="datetimeFigureOut">
               <a:rPr lang="en-US" smtClean="0"/>
-              <a:t>10/9/2018</a:t>
+              <a:t>10/11/2018</a:t>
             </a:fld>
             <a:endParaRPr lang="en-US"/>
           </a:p>
@@ -2416,7 +2421,7 @@
           <a:p>
             <a:fld id="{64C42225-5FDD-4BC4-A595-FF986F799F51}" type="datetimeFigureOut">
               <a:rPr lang="en-US" smtClean="0"/>
-              <a:t>10/9/2018</a:t>
+              <a:t>10/11/2018</a:t>
             </a:fld>
             <a:endParaRPr lang="en-US"/>
           </a:p>
@@ -2727,7 +2732,7 @@
           <a:p>
             <a:fld id="{64C42225-5FDD-4BC4-A595-FF986F799F51}" type="datetimeFigureOut">
               <a:rPr lang="en-US" smtClean="0"/>
-              <a:t>10/9/2018</a:t>
+              <a:t>10/11/2018</a:t>
             </a:fld>
             <a:endParaRPr lang="en-US"/>
           </a:p>
@@ -3015,7 +3020,7 @@
           <a:p>
             <a:fld id="{64C42225-5FDD-4BC4-A595-FF986F799F51}" type="datetimeFigureOut">
               <a:rPr lang="en-US" smtClean="0"/>
-              <a:t>10/9/2018</a:t>
+              <a:t>10/11/2018</a:t>
             </a:fld>
             <a:endParaRPr lang="en-US"/>
           </a:p>
@@ -3256,7 +3261,7 @@
           <a:p>
             <a:fld id="{64C42225-5FDD-4BC4-A595-FF986F799F51}" type="datetimeFigureOut">
               <a:rPr lang="en-US" smtClean="0"/>
-              <a:t>10/9/2018</a:t>
+              <a:t>10/11/2018</a:t>
             </a:fld>
             <a:endParaRPr lang="en-US"/>
           </a:p>
@@ -3724,7 +3729,7 @@
         <p:spPr>
           <a:xfrm>
             <a:off x="-2" y="2916312"/>
-            <a:ext cx="6477001" cy="1996893"/>
+            <a:ext cx="6477001" cy="2273892"/>
           </a:xfrm>
           <a:prstGeom prst="rect">
             <a:avLst/>
@@ -3779,21 +3784,7 @@
                 <a:latin typeface="Segoe UI" panose="020B0502040204020203" pitchFamily="34" charset="0"/>
                 <a:cs typeface="Segoe UI" panose="020B0502040204020203" pitchFamily="34" charset="0"/>
               </a:rPr>
-              <a:t>Getting sensors provided by Dr. McCourt to send and receive positioning data back and forth. Four sensors located in a room and one located on the </a:t>
-            </a:r>
-            <a:r>
-              <a:rPr lang="en-US" sz="1200" dirty="0" err="1">
-                <a:latin typeface="Segoe UI" panose="020B0502040204020203" pitchFamily="34" charset="0"/>
-                <a:cs typeface="Segoe UI" panose="020B0502040204020203" pitchFamily="34" charset="0"/>
-              </a:rPr>
-              <a:t>Burgerbot</a:t>
-            </a:r>
-            <a:r>
-              <a:rPr lang="en-US" sz="1200" dirty="0">
-                <a:latin typeface="Segoe UI" panose="020B0502040204020203" pitchFamily="34" charset="0"/>
-                <a:cs typeface="Segoe UI" panose="020B0502040204020203" pitchFamily="34" charset="0"/>
-              </a:rPr>
-              <a:t>.</a:t>
+              <a:t>Implement Dr. McCourt’s linear filter for mitigating delay control signals.</a:t>
             </a:r>
           </a:p>
           <a:p>
@@ -3809,7 +3800,21 @@
                 <a:latin typeface="Segoe UI" panose="020B0502040204020203" pitchFamily="34" charset="0"/>
                 <a:cs typeface="Segoe UI" panose="020B0502040204020203" pitchFamily="34" charset="0"/>
               </a:rPr>
-              <a:t>Getting the webcam provided by Dr. McCourt to work with OpenCV and SLAM.</a:t>
+              <a:t>Getting sensors provided by Dr. McCourt to send and receive positioning data back and forth. Four sensors located in a room and one located on the </a:t>
+            </a:r>
+            <a:r>
+              <a:rPr lang="en-US" sz="1200" dirty="0" err="1">
+                <a:latin typeface="Segoe UI" panose="020B0502040204020203" pitchFamily="34" charset="0"/>
+                <a:cs typeface="Segoe UI" panose="020B0502040204020203" pitchFamily="34" charset="0"/>
+              </a:rPr>
+              <a:t>Burgerbot</a:t>
+            </a:r>
+            <a:r>
+              <a:rPr lang="en-US" sz="1200" dirty="0">
+                <a:latin typeface="Segoe UI" panose="020B0502040204020203" pitchFamily="34" charset="0"/>
+                <a:cs typeface="Segoe UI" panose="020B0502040204020203" pitchFamily="34" charset="0"/>
+              </a:rPr>
+              <a:t>.</a:t>
             </a:r>
           </a:p>
           <a:p>
@@ -3825,6 +3830,22 @@
                 <a:latin typeface="Segoe UI" panose="020B0502040204020203" pitchFamily="34" charset="0"/>
                 <a:cs typeface="Segoe UI" panose="020B0502040204020203" pitchFamily="34" charset="0"/>
               </a:rPr>
+              <a:t>Getting the webcam provided by Dr. McCourt to work with OpenCV and SLAM.</a:t>
+            </a:r>
+          </a:p>
+          <a:p>
+            <a:pPr marL="342900" indent="-342900">
+              <a:lnSpc>
+                <a:spcPct val="150000"/>
+              </a:lnSpc>
+              <a:buFont typeface="+mj-lt"/>
+              <a:buAutoNum type="arabicPeriod"/>
+            </a:pPr>
+            <a:r>
+              <a:rPr lang="en-US" sz="1200" dirty="0">
+                <a:latin typeface="Segoe UI" panose="020B0502040204020203" pitchFamily="34" charset="0"/>
+                <a:cs typeface="Segoe UI" panose="020B0502040204020203" pitchFamily="34" charset="0"/>
+              </a:rPr>
               <a:t>Using real-time object detection using deep learning and OpenCV. This will require networking (probably).</a:t>
             </a:r>
           </a:p>
@@ -3844,7 +3865,7 @@
         </p:nvSpPr>
         <p:spPr>
           <a:xfrm>
-            <a:off x="-1" y="2506746"/>
+            <a:off x="-3" y="2444863"/>
             <a:ext cx="6477001" cy="461665"/>
           </a:xfrm>
           <a:prstGeom prst="rect">

</xml_diff>